<commit_message>
slide updates after comments
</commit_message>
<xml_diff>
--- a/module-3/ppt/3.0-Overview.pptx
+++ b/module-3/ppt/3.0-Overview.pptx
@@ -16,9 +16,9 @@
     <p:sldId id="614" r:id="rId7"/>
     <p:sldId id="616" r:id="rId8"/>
     <p:sldId id="2611" r:id="rId9"/>
-    <p:sldId id="2616" r:id="rId10"/>
-    <p:sldId id="2615" r:id="rId11"/>
-    <p:sldId id="2625" r:id="rId12"/>
+    <p:sldId id="2625" r:id="rId10"/>
+    <p:sldId id="2616" r:id="rId11"/>
+    <p:sldId id="2615" r:id="rId12"/>
     <p:sldId id="2617" r:id="rId13"/>
     <p:sldId id="2626" r:id="rId14"/>
     <p:sldId id="2628" r:id="rId15"/>
@@ -12415,7 +12415,7 @@
                 <a:latin typeface="Arial" panose="020B0604020202020204" pitchFamily="34" charset="0"/>
                 <a:cs typeface="Arial" panose="020B0604020202020204" pitchFamily="34" charset="0"/>
               </a:rPr>
-              <a:t>Overview and Attacks</a:t>
+              <a:t>Overview</a:t>
             </a:r>
           </a:p>
           <a:p>
@@ -12721,7 +12721,7 @@
           <p:cNvPr id="5" name="Title 4">
             <a:extLst>
               <a:ext uri="{FF2B5EF4-FFF2-40B4-BE49-F238E27FC236}">
-                <a16:creationId xmlns:a16="http://schemas.microsoft.com/office/drawing/2014/main" id="{4E2547A2-3929-504C-B491-D57575516C79}"/>
+                <a16:creationId xmlns:a16="http://schemas.microsoft.com/office/drawing/2014/main" id="{3C485A7A-6D4C-6449-95D3-D40C9E876BB6}"/>
               </a:ext>
             </a:extLst>
           </p:cNvPr>
@@ -12729,109 +12729,35 @@
             <a:spLocks noGrp="1"/>
           </p:cNvSpPr>
           <p:nvPr>
-            <p:ph type="title"/>
+            <p:ph type="ctrTitle"/>
           </p:nvPr>
         </p:nvSpPr>
         <p:spPr/>
         <p:txBody>
-          <a:bodyPr/>
+          <a:bodyPr>
+            <a:normAutofit/>
+          </a:bodyPr>
           <a:lstStyle/>
           <a:p>
             <a:r>
-              <a:rPr lang="en-US" dirty="0"/>
-              <a:t>Simple Example: Naïve Bayes</a:t>
-            </a:r>
-          </a:p>
-        </p:txBody>
-      </p:sp>
-      <p:sp>
-        <p:nvSpPr>
-          <p:cNvPr id="6" name="Content Placeholder 5">
-            <a:extLst>
-              <a:ext uri="{FF2B5EF4-FFF2-40B4-BE49-F238E27FC236}">
-                <a16:creationId xmlns:a16="http://schemas.microsoft.com/office/drawing/2014/main" id="{EA0BDB3B-E648-A74B-9CD8-3E55D1D39FFD}"/>
-              </a:ext>
-            </a:extLst>
-          </p:cNvPr>
-          <p:cNvSpPr>
-            <a:spLocks noGrp="1"/>
-          </p:cNvSpPr>
-          <p:nvPr>
-            <p:ph idx="1"/>
-          </p:nvPr>
-        </p:nvSpPr>
-        <p:spPr/>
-        <p:txBody>
-          <a:bodyPr/>
-          <a:lstStyle/>
-          <a:p>
-            <a:r>
-              <a:rPr lang="en-US" dirty="0"/>
-              <a:t>Intuition: Words in spam emails differ from those in legitimate email.</a:t>
-            </a:r>
-          </a:p>
-          <a:p>
-            <a:endParaRPr lang="en-US" dirty="0"/>
-          </a:p>
-          <a:p>
-            <a:r>
-              <a:rPr lang="en-US" dirty="0"/>
-              <a:t>Can use prior probabilities of seeing a word, given spam or ham, to compute posteriors of spam or ham.</a:t>
-            </a:r>
-          </a:p>
-          <a:p>
-            <a:endParaRPr lang="en-US" dirty="0"/>
-          </a:p>
-          <a:p>
-            <a:r>
-              <a:rPr lang="en-US" dirty="0"/>
-              <a:t>Common early-stage spam filter (e.g., </a:t>
-            </a:r>
-            <a:r>
-              <a:rPr lang="en-US" dirty="0" err="1"/>
-              <a:t>SpamAssassin</a:t>
-            </a:r>
-            <a:r>
-              <a:rPr lang="en-US" dirty="0"/>
-              <a:t>)</a:t>
-            </a:r>
-          </a:p>
-        </p:txBody>
-      </p:sp>
-      <p:sp>
-        <p:nvSpPr>
-          <p:cNvPr id="4" name="Slide Number Placeholder 3">
-            <a:extLst>
-              <a:ext uri="{FF2B5EF4-FFF2-40B4-BE49-F238E27FC236}">
-                <a16:creationId xmlns:a16="http://schemas.microsoft.com/office/drawing/2014/main" id="{C89EADC0-0074-1044-B99A-E9C79066FD4F}"/>
-              </a:ext>
-            </a:extLst>
-          </p:cNvPr>
-          <p:cNvSpPr>
-            <a:spLocks noGrp="1"/>
-          </p:cNvSpPr>
-          <p:nvPr>
-            <p:ph type="sldNum" sz="quarter" idx="12"/>
-          </p:nvPr>
-        </p:nvSpPr>
-        <p:spPr/>
-        <p:txBody>
-          <a:bodyPr/>
-          <a:lstStyle/>
-          <a:p>
-            <a:fld id="{256CE055-ECFD-9048-9FD8-7E2D8656A4F7}" type="slidenum">
-              <a:rPr lang="en-US" smtClean="0"/>
-              <a:pPr/>
-              <a:t>10</a:t>
-            </a:fld>
-            <a:endParaRPr lang="en-US" dirty="0"/>
+              <a:rPr lang="en-US" sz="4000" dirty="0"/>
+              <a:t>DEMONSTRATION:</a:t>
+            </a:r>
+            <a:br>
+              <a:rPr lang="en-US" sz="4000" dirty="0"/>
+            </a:br>
+            <a:r>
+              <a:rPr lang="en-US" sz="4000"/>
+              <a:t>SPAM Detection</a:t>
+            </a:r>
+            <a:endParaRPr lang="en-US" sz="4000" dirty="0"/>
           </a:p>
         </p:txBody>
       </p:sp>
     </p:spTree>
     <p:extLst>
       <p:ext uri="{BB962C8B-B14F-4D97-AF65-F5344CB8AC3E}">
-        <p14:creationId xmlns:p14="http://schemas.microsoft.com/office/powerpoint/2010/main" val="2421584383"/>
+        <p14:creationId xmlns:p14="http://schemas.microsoft.com/office/powerpoint/2010/main" val="3762927356"/>
       </p:ext>
     </p:extLst>
   </p:cSld>
@@ -13611,7 +13537,7 @@
           <a:p>
             <a:r>
               <a:rPr lang="en-US" dirty="0"/>
-              <a:t>Spam: A persistent security threat</a:t>
+              <a:t>Spam: A Persistent Security Threat</a:t>
             </a:r>
           </a:p>
         </p:txBody>
@@ -13660,35 +13586,6 @@
           </a:p>
           <a:p>
             <a:endParaRPr lang="en-US" dirty="0"/>
-          </a:p>
-        </p:txBody>
-      </p:sp>
-      <p:sp>
-        <p:nvSpPr>
-          <p:cNvPr id="3" name="Text Placeholder 2"/>
-          <p:cNvSpPr>
-            <a:spLocks noGrp="1"/>
-          </p:cNvSpPr>
-          <p:nvPr>
-            <p:ph type="body" sz="quarter" idx="4294967295"/>
-          </p:nvPr>
-        </p:nvSpPr>
-        <p:spPr>
-          <a:xfrm>
-            <a:off x="0" y="19050"/>
-            <a:ext cx="2286000" cy="393700"/>
-          </a:xfrm>
-        </p:spPr>
-        <p:txBody>
-          <a:bodyPr>
-            <a:normAutofit fontScale="85000" lnSpcReduction="20000"/>
-          </a:bodyPr>
-          <a:lstStyle/>
-          <a:p>
-            <a:r>
-              <a:rPr lang="en-US" dirty="0"/>
-              <a:t>Introduction</a:t>
-            </a:r>
           </a:p>
         </p:txBody>
       </p:sp>
@@ -13769,7 +13666,7 @@
           <a:p>
             <a:r>
               <a:rPr lang="en-US" dirty="0"/>
-              <a:t>Negative impact of spam</a:t>
+              <a:t>Negative Impact of Spam</a:t>
             </a:r>
           </a:p>
         </p:txBody>
@@ -13784,7 +13681,12 @@
             <p:ph idx="1"/>
           </p:nvPr>
         </p:nvSpPr>
-        <p:spPr/>
+        <p:spPr>
+          <a:xfrm>
+            <a:off x="838199" y="1440145"/>
+            <a:ext cx="10515600" cy="4157428"/>
+          </a:xfrm>
+        </p:spPr>
         <p:txBody>
           <a:bodyPr>
             <a:normAutofit lnSpcReduction="10000"/>
@@ -13897,35 +13799,6 @@
               <a:t>trojans</a:t>
             </a:r>
             <a:endParaRPr lang="en-US" sz="2200" dirty="0"/>
-          </a:p>
-        </p:txBody>
-      </p:sp>
-      <p:sp>
-        <p:nvSpPr>
-          <p:cNvPr id="3" name="Text Placeholder 2"/>
-          <p:cNvSpPr>
-            <a:spLocks noGrp="1"/>
-          </p:cNvSpPr>
-          <p:nvPr>
-            <p:ph type="body" sz="quarter" idx="4294967295"/>
-          </p:nvPr>
-        </p:nvSpPr>
-        <p:spPr>
-          <a:xfrm>
-            <a:off x="0" y="19050"/>
-            <a:ext cx="2286000" cy="393700"/>
-          </a:xfrm>
-        </p:spPr>
-        <p:txBody>
-          <a:bodyPr>
-            <a:normAutofit fontScale="85000" lnSpcReduction="20000"/>
-          </a:bodyPr>
-          <a:lstStyle/>
-          <a:p>
-            <a:r>
-              <a:rPr lang="en-US" dirty="0"/>
-              <a:t>Introduction</a:t>
-            </a:r>
           </a:p>
         </p:txBody>
       </p:sp>
@@ -13976,7 +13849,7 @@
         </p:nvSpPr>
         <p:spPr bwMode="auto">
           <a:xfrm>
-            <a:off x="1790639" y="5933023"/>
+            <a:off x="163007" y="5506004"/>
             <a:ext cx="5643094" cy="666754"/>
           </a:xfrm>
           <a:prstGeom prst="rect">
@@ -14008,35 +13881,35 @@
               <a:defRPr/>
             </a:pPr>
             <a:r>
-              <a:rPr lang="en-US" sz="2000" kern="0" dirty="0">
+              <a:rPr lang="en-US" sz="1600" kern="0" dirty="0">
                 <a:latin typeface="Arial"/>
                 <a:cs typeface="Arial"/>
               </a:rPr>
               <a:t>*</a:t>
             </a:r>
             <a:r>
-              <a:rPr lang="en-US" sz="1400" kern="0" dirty="0" err="1">
+              <a:rPr lang="en-US" sz="1100" kern="0" dirty="0" err="1">
                 <a:latin typeface="Arial"/>
                 <a:cs typeface="Arial"/>
               </a:rPr>
               <a:t>Rao</a:t>
             </a:r>
             <a:r>
-              <a:rPr lang="en-US" sz="1400" kern="0" dirty="0">
+              <a:rPr lang="en-US" sz="1100" kern="0" dirty="0">
                 <a:latin typeface="Arial"/>
                 <a:cs typeface="Arial"/>
               </a:rPr>
               <a:t> </a:t>
             </a:r>
             <a:r>
-              <a:rPr lang="en-US" sz="1400" i="1" kern="0" dirty="0">
+              <a:rPr lang="en-US" sz="1100" i="1" kern="0" dirty="0">
                 <a:latin typeface="Arial"/>
                 <a:cs typeface="Arial"/>
               </a:rPr>
               <a:t>et al</a:t>
             </a:r>
             <a:r>
-              <a:rPr lang="en-US" sz="1400" kern="0" dirty="0">
+              <a:rPr lang="en-US" sz="1100" kern="0" dirty="0">
                 <a:latin typeface="Arial"/>
                 <a:cs typeface="Arial"/>
               </a:rPr>
@@ -14054,7 +13927,7 @@
               <a:defRPr/>
             </a:pPr>
             <a:r>
-              <a:rPr lang="en-US" sz="1400" kern="0" dirty="0">
+              <a:rPr lang="en-US" sz="1100" kern="0" dirty="0">
                 <a:latin typeface="Arial"/>
                 <a:cs typeface="Arial"/>
               </a:rPr>
@@ -14405,10 +14278,92 @@
       </p:grpSpPr>
       <p:sp>
         <p:nvSpPr>
+          <p:cNvPr id="5" name="Title 4">
+            <a:extLst>
+              <a:ext uri="{FF2B5EF4-FFF2-40B4-BE49-F238E27FC236}">
+                <a16:creationId xmlns:a16="http://schemas.microsoft.com/office/drawing/2014/main" id="{4E2547A2-3929-504C-B491-D57575516C79}"/>
+              </a:ext>
+            </a:extLst>
+          </p:cNvPr>
+          <p:cNvSpPr>
+            <a:spLocks noGrp="1"/>
+          </p:cNvSpPr>
+          <p:nvPr>
+            <p:ph type="title"/>
+          </p:nvPr>
+        </p:nvSpPr>
+        <p:spPr/>
+        <p:txBody>
+          <a:bodyPr/>
+          <a:lstStyle/>
+          <a:p>
+            <a:r>
+              <a:rPr lang="en-US" dirty="0"/>
+              <a:t>Simple Example: Naïve Bayes</a:t>
+            </a:r>
+          </a:p>
+        </p:txBody>
+      </p:sp>
+      <p:sp>
+        <p:nvSpPr>
+          <p:cNvPr id="6" name="Content Placeholder 5">
+            <a:extLst>
+              <a:ext uri="{FF2B5EF4-FFF2-40B4-BE49-F238E27FC236}">
+                <a16:creationId xmlns:a16="http://schemas.microsoft.com/office/drawing/2014/main" id="{EA0BDB3B-E648-A74B-9CD8-3E55D1D39FFD}"/>
+              </a:ext>
+            </a:extLst>
+          </p:cNvPr>
+          <p:cNvSpPr>
+            <a:spLocks noGrp="1"/>
+          </p:cNvSpPr>
+          <p:nvPr>
+            <p:ph idx="1"/>
+          </p:nvPr>
+        </p:nvSpPr>
+        <p:spPr/>
+        <p:txBody>
+          <a:bodyPr/>
+          <a:lstStyle/>
+          <a:p>
+            <a:r>
+              <a:rPr lang="en-US" dirty="0"/>
+              <a:t>Intuition: Words in spam emails differ from those in legitimate email.</a:t>
+            </a:r>
+          </a:p>
+          <a:p>
+            <a:endParaRPr lang="en-US" dirty="0"/>
+          </a:p>
+          <a:p>
+            <a:r>
+              <a:rPr lang="en-US" dirty="0"/>
+              <a:t>Can use prior probabilities of seeing a word, given spam or ham, to compute posteriors of spam or ham.</a:t>
+            </a:r>
+          </a:p>
+          <a:p>
+            <a:endParaRPr lang="en-US" dirty="0"/>
+          </a:p>
+          <a:p>
+            <a:r>
+              <a:rPr lang="en-US" dirty="0"/>
+              <a:t>Common early-stage spam filter (e.g., </a:t>
+            </a:r>
+            <a:r>
+              <a:rPr lang="en-US" dirty="0" err="1"/>
+              <a:t>SpamAssassin</a:t>
+            </a:r>
+            <a:r>
+              <a:rPr lang="en-US" dirty="0"/>
+              <a:t>)</a:t>
+            </a:r>
+          </a:p>
+        </p:txBody>
+      </p:sp>
+      <p:sp>
+        <p:nvSpPr>
           <p:cNvPr id="4" name="Slide Number Placeholder 3">
             <a:extLst>
               <a:ext uri="{FF2B5EF4-FFF2-40B4-BE49-F238E27FC236}">
-                <a16:creationId xmlns:a16="http://schemas.microsoft.com/office/drawing/2014/main" id="{E8315983-1A0A-F946-8B47-745D62F8B4F8}"/>
+                <a16:creationId xmlns:a16="http://schemas.microsoft.com/office/drawing/2014/main" id="{C89EADC0-0074-1044-B99A-E9C79066FD4F}"/>
               </a:ext>
             </a:extLst>
           </p:cNvPr>
@@ -14433,40 +14388,10 @@
           </a:p>
         </p:txBody>
       </p:sp>
-      <p:pic>
-        <p:nvPicPr>
-          <p:cNvPr id="5" name="Picture 4">
-            <a:extLst>
-              <a:ext uri="{FF2B5EF4-FFF2-40B4-BE49-F238E27FC236}">
-                <a16:creationId xmlns:a16="http://schemas.microsoft.com/office/drawing/2014/main" id="{4D5A34B4-FFB1-F844-A741-9019466DEC8A}"/>
-              </a:ext>
-            </a:extLst>
-          </p:cNvPr>
-          <p:cNvPicPr>
-            <a:picLocks noChangeAspect="1"/>
-          </p:cNvPicPr>
-          <p:nvPr/>
-        </p:nvPicPr>
-        <p:blipFill>
-          <a:blip r:embed="rId2"/>
-          <a:stretch>
-            <a:fillRect/>
-          </a:stretch>
-        </p:blipFill>
-        <p:spPr>
-          <a:xfrm>
-            <a:off x="1377829" y="112064"/>
-            <a:ext cx="9357453" cy="5868112"/>
-          </a:xfrm>
-          <a:prstGeom prst="rect">
-            <a:avLst/>
-          </a:prstGeom>
-        </p:spPr>
-      </p:pic>
     </p:spTree>
     <p:extLst>
       <p:ext uri="{BB962C8B-B14F-4D97-AF65-F5344CB8AC3E}">
-        <p14:creationId xmlns:p14="http://schemas.microsoft.com/office/powerpoint/2010/main" val="966193772"/>
+        <p14:creationId xmlns:p14="http://schemas.microsoft.com/office/powerpoint/2010/main" val="2421584383"/>
       </p:ext>
     </p:extLst>
   </p:cSld>
@@ -14495,10 +14420,10 @@
       </p:grpSpPr>
       <p:sp>
         <p:nvSpPr>
-          <p:cNvPr id="5" name="Title 4">
+          <p:cNvPr id="4" name="Slide Number Placeholder 3">
             <a:extLst>
               <a:ext uri="{FF2B5EF4-FFF2-40B4-BE49-F238E27FC236}">
-                <a16:creationId xmlns:a16="http://schemas.microsoft.com/office/drawing/2014/main" id="{3C485A7A-6D4C-6449-95D3-D40C9E876BB6}"/>
+                <a16:creationId xmlns:a16="http://schemas.microsoft.com/office/drawing/2014/main" id="{E8315983-1A0A-F946-8B47-745D62F8B4F8}"/>
               </a:ext>
             </a:extLst>
           </p:cNvPr>
@@ -14506,35 +14431,57 @@
             <a:spLocks noGrp="1"/>
           </p:cNvSpPr>
           <p:nvPr>
-            <p:ph type="ctrTitle"/>
+            <p:ph type="sldNum" sz="quarter" idx="12"/>
           </p:nvPr>
         </p:nvSpPr>
         <p:spPr/>
         <p:txBody>
-          <a:bodyPr>
-            <a:normAutofit/>
-          </a:bodyPr>
+          <a:bodyPr/>
           <a:lstStyle/>
           <a:p>
-            <a:r>
-              <a:rPr lang="en-US" sz="4000" dirty="0"/>
-              <a:t>DEMONSTRATION:</a:t>
-            </a:r>
-            <a:br>
-              <a:rPr lang="en-US" sz="4000" dirty="0"/>
-            </a:br>
-            <a:r>
-              <a:rPr lang="en-US" sz="4000"/>
-              <a:t>SPAM Detection</a:t>
-            </a:r>
-            <a:endParaRPr lang="en-US" sz="4000" dirty="0"/>
-          </a:p>
-        </p:txBody>
-      </p:sp>
+            <a:fld id="{256CE055-ECFD-9048-9FD8-7E2D8656A4F7}" type="slidenum">
+              <a:rPr lang="en-US" smtClean="0"/>
+              <a:pPr/>
+              <a:t>9</a:t>
+            </a:fld>
+            <a:endParaRPr lang="en-US" dirty="0"/>
+          </a:p>
+        </p:txBody>
+      </p:sp>
+      <p:pic>
+        <p:nvPicPr>
+          <p:cNvPr id="5" name="Picture 4">
+            <a:extLst>
+              <a:ext uri="{FF2B5EF4-FFF2-40B4-BE49-F238E27FC236}">
+                <a16:creationId xmlns:a16="http://schemas.microsoft.com/office/drawing/2014/main" id="{4D5A34B4-FFB1-F844-A741-9019466DEC8A}"/>
+              </a:ext>
+            </a:extLst>
+          </p:cNvPr>
+          <p:cNvPicPr>
+            <a:picLocks noChangeAspect="1"/>
+          </p:cNvPicPr>
+          <p:nvPr/>
+        </p:nvPicPr>
+        <p:blipFill>
+          <a:blip r:embed="rId2"/>
+          <a:stretch>
+            <a:fillRect/>
+          </a:stretch>
+        </p:blipFill>
+        <p:spPr>
+          <a:xfrm>
+            <a:off x="1377829" y="112064"/>
+            <a:ext cx="9357453" cy="5868112"/>
+          </a:xfrm>
+          <a:prstGeom prst="rect">
+            <a:avLst/>
+          </a:prstGeom>
+        </p:spPr>
+      </p:pic>
     </p:spTree>
     <p:extLst>
       <p:ext uri="{BB962C8B-B14F-4D97-AF65-F5344CB8AC3E}">
-        <p14:creationId xmlns:p14="http://schemas.microsoft.com/office/powerpoint/2010/main" val="3762927356"/>
+        <p14:creationId xmlns:p14="http://schemas.microsoft.com/office/powerpoint/2010/main" val="966193772"/>
       </p:ext>
     </p:extLst>
   </p:cSld>

</xml_diff>